<commit_message>
meta: update and fix examples
Fixes #54
</commit_message>
<xml_diff>
--- a/_examples/presentation/simple/simple.pptx
+++ b/_examples/presentation/simple/simple.pptx
@@ -86,7 +86,7 @@
 </file>
 
 <file path=ppt/theme/theme1.xml><?xml version="1.0" encoding="utf-8"?>
-<a:theme xmlns="http://schemas.openxmlformats.org/drawingml/2006/main" xmlns:a="http://schemas.openxmlformats.org/drawingml/2006/main" xmlns:r="http://schemas.openxmlformats.org/officeDocument/2006/relationships" xmlns:s="http://schemas.openxmlformats.org/officeDocument/2006/sharedTypes" xmlns:xml="http://www.w3.org/XML/1998/namespace" name="gooxml Theme">
+<a:theme xmlns="http://schemas.openxmlformats.org/drawingml/2006/main" xmlns:a="http://schemas.openxmlformats.org/drawingml/2006/main" xmlns:r="http://schemas.openxmlformats.org/officeDocument/2006/relationships" xmlns:sh="http://schemas.openxmlformats.org/officeDocument/2006/sharedTypes" xmlns:xml="http://www.w3.org/XML/1998/namespace" name="gooxml Theme">
   <a:themeElements>
     <a:clrScheme name="Office">
       <a:dk1>
@@ -143,7 +143,7 @@
         <a:solidFill>
           <a:schemeClr val="phClr"/>
         </a:solidFill>
-        <a:gradFill rotWithShape="true">
+        <a:gradFill rotWithShape="1">
           <a:gsLst>
             <a:gs pos="0">
               <a:schemeClr val="phClr"/>
@@ -152,9 +152,9 @@
               <a:schemeClr val="phClr"/>
             </a:gs>
           </a:gsLst>
-          <a:lin ang="5400000" scaled="false"/>
+          <a:lin ang="5400000" scaled="0"/>
         </a:gradFill>
-        <a:gradFill rotWithShape="true">
+        <a:gradFill rotWithShape="1">
           <a:gsLst>
             <a:gs pos="0">
               <a:schemeClr val="phClr"/>
@@ -163,7 +163,7 @@
               <a:schemeClr val="phClr"/>
             </a:gs>
           </a:gsLst>
-          <a:lin ang="5400000" scaled="false"/>
+          <a:lin ang="5400000" scaled="0"/>
         </a:gradFill>
       </a:fillStyleLst>
       <a:lnStyleLst>
@@ -189,7 +189,7 @@
         <a:solidFill>
           <a:schemeClr val="phClr"/>
         </a:solidFill>
-        <a:gradFill rotWithShape="true">
+        <a:gradFill rotWithShape="1">
           <a:gsLst>
             <a:gs pos="0">
               <a:schemeClr val="phClr"/>
@@ -198,7 +198,7 @@
               <a:schemeClr val="phClr"/>
             </a:gs>
           </a:gsLst>
-          <a:lin ang="5400000" scaled="false"/>
+          <a:lin ang="5400000" scaled="0"/>
         </a:gradFill>
       </a:bgFillStyleLst>
     </a:fmtScheme>

</xml_diff>

<commit_message>
presentation: initial work for presentations
</commit_message>
<xml_diff>
--- a/_examples/presentation/simple/simple.pptx
+++ b/_examples/presentation/simple/simple.pptx
@@ -62,24 +62,6 @@
           <a:chExt cx="0" cy="0"/>
         </a:xfrm>
       </p:grpSpPr>
-      <p:sp>
-        <p:nvSpPr>
-          <p:cNvPr id="0" name=""/>
-          <p:cNvSpPr/>
-          <p:nvPr>
-            <p:ph type="ctrTitle"/>
-          </p:nvPr>
-        </p:nvSpPr>
-        <p:spPr/>
-        <p:txBody>
-          <a:bodyPr/>
-          <a:p>
-            <a:r>
-              <a:t>testing 123</a:t>
-            </a:r>
-          </a:p>
-        </p:txBody>
-      </p:sp>
     </p:spTree>
   </p:cSld>
 </p:sld>

</xml_diff>

<commit_message>
presentation: support adding textboxes
Allow adding a textbox to a slide
</commit_message>
<xml_diff>
--- a/_examples/presentation/simple/simple.pptx
+++ b/_examples/presentation/simple/simple.pptx
@@ -6,6 +6,10 @@
   </p:sldMasterIdLst>
   <p:sldIdLst>
     <p:sldId id="256" r:id="rId3"/>
+    <p:sldId id="257" r:id="rId4"/>
+    <p:sldId id="258" r:id="rId5"/>
+    <p:sldId id="259" r:id="rId6"/>
+    <p:sldId id="260" r:id="rId7"/>
   </p:sldIdLst>
   <p:notesSz cx="6858000" cy="9144000"/>
 </p:presentation>
@@ -62,6 +66,264 @@
           <a:chExt cx="0" cy="0"/>
         </a:xfrm>
       </p:grpSpPr>
+      <p:sp>
+        <p:nvSpPr>
+          <p:cNvPr id="0" name=""/>
+          <p:cNvSpPr/>
+          <p:nvPr/>
+        </p:nvSpPr>
+        <p:spPr>
+          <a:xfrm>
+            <a:off x="0" y="0"/>
+            <a:ext cx="2743200" cy="914400"/>
+          </a:xfrm>
+          <a:prstGeom prst="star10"/>
+          <a:solidFill>
+            <a:srgbClr val="f0f8ff"/>
+          </a:solidFill>
+          <a:ln>
+            <a:solidFill>
+              <a:srgbClr val="0000ff"/>
+            </a:solidFill>
+          </a:ln>
+        </p:spPr>
+        <p:txBody>
+          <a:bodyPr wrap="square">
+            <a:spAutoFit/>
+          </a:bodyPr>
+          <a:p>
+            <a:pPr algn="ctr"/>
+            <a:r>
+              <a:rPr sz="2400"/>
+              <a:t>gooxml</a:t>
+            </a:r>
+          </a:p>
+        </p:txBody>
+      </p:sp>
+    </p:spTree>
+  </p:cSld>
+</p:sld>
+</file>
+
+<file path=ppt/slides/slide2.xml><?xml version="1.0" encoding="utf-8"?>
+<p:sld xmlns="http://schemas.openxmlformats.org/presentationml/2006/main" xmlns:a="http://schemas.openxmlformats.org/drawingml/2006/main" xmlns:p="http://schemas.openxmlformats.org/presentationml/2006/main" xmlns:r="http://schemas.openxmlformats.org/officeDocument/2006/relationships" xmlns:sh="http://schemas.openxmlformats.org/officeDocument/2006/sharedTypes" xmlns:xml="http://www.w3.org/XML/1998/namespace">
+  <p:cSld>
+    <p:spTree>
+      <p:nvGrpSpPr>
+        <p:cNvPr id="1" name=""/>
+        <p:cNvGrpSpPr/>
+        <p:nvPr/>
+      </p:nvGrpSpPr>
+      <p:grpSpPr>
+        <a:xfrm>
+          <a:off x="0" y="0"/>
+          <a:ext cx="0" cy="0"/>
+          <a:chOff x="0" y="0"/>
+          <a:chExt cx="0" cy="0"/>
+        </a:xfrm>
+      </p:grpSpPr>
+      <p:sp>
+        <p:nvSpPr>
+          <p:cNvPr id="0" name=""/>
+          <p:cNvSpPr/>
+          <p:nvPr/>
+        </p:nvSpPr>
+        <p:spPr>
+          <a:xfrm>
+            <a:off x="914400" y="914400"/>
+            <a:ext cx="2743200" cy="914400"/>
+          </a:xfrm>
+          <a:prstGeom prst="star10"/>
+          <a:solidFill>
+            <a:srgbClr val="f0f8ff"/>
+          </a:solidFill>
+          <a:ln>
+            <a:solidFill>
+              <a:srgbClr val="0000ff"/>
+            </a:solidFill>
+          </a:ln>
+        </p:spPr>
+        <p:txBody>
+          <a:bodyPr wrap="square">
+            <a:spAutoFit/>
+          </a:bodyPr>
+          <a:p>
+            <a:pPr algn="ctr"/>
+            <a:r>
+              <a:rPr sz="2400"/>
+              <a:t>gooxml</a:t>
+            </a:r>
+          </a:p>
+        </p:txBody>
+      </p:sp>
+    </p:spTree>
+  </p:cSld>
+</p:sld>
+</file>
+
+<file path=ppt/slides/slide3.xml><?xml version="1.0" encoding="utf-8"?>
+<p:sld xmlns="http://schemas.openxmlformats.org/presentationml/2006/main" xmlns:a="http://schemas.openxmlformats.org/drawingml/2006/main" xmlns:p="http://schemas.openxmlformats.org/presentationml/2006/main" xmlns:r="http://schemas.openxmlformats.org/officeDocument/2006/relationships" xmlns:sh="http://schemas.openxmlformats.org/officeDocument/2006/sharedTypes" xmlns:xml="http://www.w3.org/XML/1998/namespace">
+  <p:cSld>
+    <p:spTree>
+      <p:nvGrpSpPr>
+        <p:cNvPr id="1" name=""/>
+        <p:cNvGrpSpPr/>
+        <p:nvPr/>
+      </p:nvGrpSpPr>
+      <p:grpSpPr>
+        <a:xfrm>
+          <a:off x="0" y="0"/>
+          <a:ext cx="0" cy="0"/>
+          <a:chOff x="0" y="0"/>
+          <a:chExt cx="0" cy="0"/>
+        </a:xfrm>
+      </p:grpSpPr>
+      <p:sp>
+        <p:nvSpPr>
+          <p:cNvPr id="0" name=""/>
+          <p:cNvSpPr/>
+          <p:nvPr/>
+        </p:nvSpPr>
+        <p:spPr>
+          <a:xfrm>
+            <a:off x="1828800" y="1828800"/>
+            <a:ext cx="2743200" cy="914400"/>
+          </a:xfrm>
+          <a:prstGeom prst="star10"/>
+          <a:solidFill>
+            <a:srgbClr val="f0f8ff"/>
+          </a:solidFill>
+          <a:ln>
+            <a:solidFill>
+              <a:srgbClr val="0000ff"/>
+            </a:solidFill>
+          </a:ln>
+        </p:spPr>
+        <p:txBody>
+          <a:bodyPr wrap="square">
+            <a:spAutoFit/>
+          </a:bodyPr>
+          <a:p>
+            <a:pPr algn="ctr"/>
+            <a:r>
+              <a:rPr sz="2400"/>
+              <a:t>gooxml</a:t>
+            </a:r>
+          </a:p>
+        </p:txBody>
+      </p:sp>
+    </p:spTree>
+  </p:cSld>
+</p:sld>
+</file>
+
+<file path=ppt/slides/slide4.xml><?xml version="1.0" encoding="utf-8"?>
+<p:sld xmlns="http://schemas.openxmlformats.org/presentationml/2006/main" xmlns:a="http://schemas.openxmlformats.org/drawingml/2006/main" xmlns:p="http://schemas.openxmlformats.org/presentationml/2006/main" xmlns:r="http://schemas.openxmlformats.org/officeDocument/2006/relationships" xmlns:sh="http://schemas.openxmlformats.org/officeDocument/2006/sharedTypes" xmlns:xml="http://www.w3.org/XML/1998/namespace">
+  <p:cSld>
+    <p:spTree>
+      <p:nvGrpSpPr>
+        <p:cNvPr id="1" name=""/>
+        <p:cNvGrpSpPr/>
+        <p:nvPr/>
+      </p:nvGrpSpPr>
+      <p:grpSpPr>
+        <a:xfrm>
+          <a:off x="0" y="0"/>
+          <a:ext cx="0" cy="0"/>
+          <a:chOff x="0" y="0"/>
+          <a:chExt cx="0" cy="0"/>
+        </a:xfrm>
+      </p:grpSpPr>
+      <p:sp>
+        <p:nvSpPr>
+          <p:cNvPr id="0" name=""/>
+          <p:cNvSpPr/>
+          <p:nvPr/>
+        </p:nvSpPr>
+        <p:spPr>
+          <a:xfrm>
+            <a:off x="2743200" y="2743200"/>
+            <a:ext cx="2743200" cy="914400"/>
+          </a:xfrm>
+          <a:prstGeom prst="star10"/>
+          <a:solidFill>
+            <a:srgbClr val="f0f8ff"/>
+          </a:solidFill>
+          <a:ln>
+            <a:solidFill>
+              <a:srgbClr val="0000ff"/>
+            </a:solidFill>
+          </a:ln>
+        </p:spPr>
+        <p:txBody>
+          <a:bodyPr wrap="square">
+            <a:spAutoFit/>
+          </a:bodyPr>
+          <a:p>
+            <a:pPr algn="ctr"/>
+            <a:r>
+              <a:rPr sz="2400"/>
+              <a:t>gooxml</a:t>
+            </a:r>
+          </a:p>
+        </p:txBody>
+      </p:sp>
+    </p:spTree>
+  </p:cSld>
+</p:sld>
+</file>
+
+<file path=ppt/slides/slide5.xml><?xml version="1.0" encoding="utf-8"?>
+<p:sld xmlns="http://schemas.openxmlformats.org/presentationml/2006/main" xmlns:a="http://schemas.openxmlformats.org/drawingml/2006/main" xmlns:p="http://schemas.openxmlformats.org/presentationml/2006/main" xmlns:r="http://schemas.openxmlformats.org/officeDocument/2006/relationships" xmlns:sh="http://schemas.openxmlformats.org/officeDocument/2006/sharedTypes" xmlns:xml="http://www.w3.org/XML/1998/namespace">
+  <p:cSld>
+    <p:spTree>
+      <p:nvGrpSpPr>
+        <p:cNvPr id="1" name=""/>
+        <p:cNvGrpSpPr/>
+        <p:nvPr/>
+      </p:nvGrpSpPr>
+      <p:grpSpPr>
+        <a:xfrm>
+          <a:off x="0" y="0"/>
+          <a:ext cx="0" cy="0"/>
+          <a:chOff x="0" y="0"/>
+          <a:chExt cx="0" cy="0"/>
+        </a:xfrm>
+      </p:grpSpPr>
+      <p:sp>
+        <p:nvSpPr>
+          <p:cNvPr id="0" name=""/>
+          <p:cNvSpPr/>
+          <p:nvPr/>
+        </p:nvSpPr>
+        <p:spPr>
+          <a:xfrm>
+            <a:off x="3657600" y="3657600"/>
+            <a:ext cx="2743200" cy="914400"/>
+          </a:xfrm>
+          <a:prstGeom prst="star10"/>
+          <a:solidFill>
+            <a:srgbClr val="f0f8ff"/>
+          </a:solidFill>
+          <a:ln>
+            <a:solidFill>
+              <a:srgbClr val="0000ff"/>
+            </a:solidFill>
+          </a:ln>
+        </p:spPr>
+        <p:txBody>
+          <a:bodyPr wrap="square">
+            <a:spAutoFit/>
+          </a:bodyPr>
+          <a:p>
+            <a:pPr algn="ctr"/>
+            <a:r>
+              <a:rPr sz="2400"/>
+              <a:t>gooxml</a:t>
+            </a:r>
+          </a:p>
+        </p:txBody>
+      </p:sp>
     </p:spTree>
   </p:cSld>
 </p:sld>

</xml_diff>